<commit_message>
Add new educational resources and update existing documents related to the pension system in Chile
- Added new documents explaining key concepts such as pensions, regulatory entities, and the role of AFPs and insurance companies.
- Introduced detailed profiles for different levels of understanding to cater to a diverse audience.
- Removed outdated Excel file on adjacency matrix for pensions.
- Added a new PNG file for precedence graph visualization.
- Updated PowerPoint presentation for validation matrix.
</commit_message>
<xml_diff>
--- a/documentos/Validación Matriz/PPT Superintendencia Validación Matriz.pptx
+++ b/documentos/Validación Matriz/PPT Superintendencia Validación Matriz.pptx
@@ -124,7 +124,7 @@
 <file path=ppt/revisionInfo.xml><?xml version="1.0" encoding="utf-8"?>
 <p1510:revInfo xmlns:a="http://schemas.openxmlformats.org/drawingml/2006/main" xmlns:r="http://schemas.openxmlformats.org/officeDocument/2006/relationships" xmlns:p1510="http://schemas.microsoft.com/office/powerpoint/2015/10/main">
   <p1510:revLst>
-    <p1510:client id="{4D9645BA-9693-4AAB-B670-E117DFDC1A3E}" v="21" dt="2025-07-29T03:18:09.372"/>
+    <p1510:client id="{4D9645BA-9693-4AAB-B670-E117DFDC1A3E}" v="22" dt="2025-07-29T15:31:36.714"/>
   </p1510:revLst>
 </p1510:revInfo>
 </file>
@@ -133,8 +133,8 @@
 <pc:chgInfo xmlns:a="http://schemas.openxmlformats.org/drawingml/2006/main" xmlns:r="http://schemas.openxmlformats.org/officeDocument/2006/relationships" xmlns:ac="http://schemas.microsoft.com/office/drawing/2013/main/command" xmlns:pc="http://schemas.microsoft.com/office/powerpoint/2013/main/command">
   <pc:docChgLst>
     <pc:chgData name="Camila Utreras" userId="21a7d57e8591b932" providerId="LiveId" clId="{4D9645BA-9693-4AAB-B670-E117DFDC1A3E}"/>
-    <pc:docChg chg="undo redo custSel modSld">
-      <pc:chgData name="Camila Utreras" userId="21a7d57e8591b932" providerId="LiveId" clId="{4D9645BA-9693-4AAB-B670-E117DFDC1A3E}" dt="2025-07-29T03:20:32.207" v="78" actId="20577"/>
+    <pc:docChg chg="undo redo custSel addSld delSld modSld">
+      <pc:chgData name="Camila Utreras" userId="21a7d57e8591b932" providerId="LiveId" clId="{4D9645BA-9693-4AAB-B670-E117DFDC1A3E}" dt="2025-07-29T15:43:03.928" v="88" actId="12385"/>
       <pc:docMkLst>
         <pc:docMk/>
       </pc:docMkLst>
@@ -208,7 +208,7 @@
         </pc:spChg>
       </pc:sldChg>
       <pc:sldChg chg="addSp delSp modSp mod">
-        <pc:chgData name="Camila Utreras" userId="21a7d57e8591b932" providerId="LiveId" clId="{4D9645BA-9693-4AAB-B670-E117DFDC1A3E}" dt="2025-07-29T03:20:32.207" v="78" actId="20577"/>
+        <pc:chgData name="Camila Utreras" userId="21a7d57e8591b932" providerId="LiveId" clId="{4D9645BA-9693-4AAB-B670-E117DFDC1A3E}" dt="2025-07-29T15:43:03.928" v="88" actId="12385"/>
         <pc:sldMkLst>
           <pc:docMk/>
           <pc:sldMk cId="1737641986" sldId="263"/>
@@ -230,7 +230,7 @@
           </ac:spMkLst>
         </pc:spChg>
         <pc:graphicFrameChg chg="add mod modGraphic">
-          <ac:chgData name="Camila Utreras" userId="21a7d57e8591b932" providerId="LiveId" clId="{4D9645BA-9693-4AAB-B670-E117DFDC1A3E}" dt="2025-07-29T03:19:36.866" v="33" actId="120"/>
+          <ac:chgData name="Camila Utreras" userId="21a7d57e8591b932" providerId="LiveId" clId="{4D9645BA-9693-4AAB-B670-E117DFDC1A3E}" dt="2025-07-29T15:43:03.928" v="88" actId="12385"/>
           <ac:graphicFrameMkLst>
             <pc:docMk/>
             <pc:sldMk cId="1737641986" sldId="263"/>
@@ -245,6 +245,45 @@
             <ac:graphicFrameMk id="12" creationId="{C3936E1D-F98E-AD12-177E-7ED6AC9AB23C}"/>
           </ac:graphicFrameMkLst>
         </pc:graphicFrameChg>
+      </pc:sldChg>
+      <pc:sldChg chg="addSp delSp modSp new del mod">
+        <pc:chgData name="Camila Utreras" userId="21a7d57e8591b932" providerId="LiveId" clId="{4D9645BA-9693-4AAB-B670-E117DFDC1A3E}" dt="2025-07-29T15:42:45.222" v="87" actId="47"/>
+        <pc:sldMkLst>
+          <pc:docMk/>
+          <pc:sldMk cId="4181677636" sldId="264"/>
+        </pc:sldMkLst>
+        <pc:spChg chg="del">
+          <ac:chgData name="Camila Utreras" userId="21a7d57e8591b932" providerId="LiveId" clId="{4D9645BA-9693-4AAB-B670-E117DFDC1A3E}" dt="2025-07-29T15:31:39.985" v="81" actId="478"/>
+          <ac:spMkLst>
+            <pc:docMk/>
+            <pc:sldMk cId="4181677636" sldId="264"/>
+            <ac:spMk id="2" creationId="{98C3A60F-BA21-2778-C002-5CBAEE40C95D}"/>
+          </ac:spMkLst>
+        </pc:spChg>
+        <pc:spChg chg="del">
+          <ac:chgData name="Camila Utreras" userId="21a7d57e8591b932" providerId="LiveId" clId="{4D9645BA-9693-4AAB-B670-E117DFDC1A3E}" dt="2025-07-29T15:31:36.714" v="80"/>
+          <ac:spMkLst>
+            <pc:docMk/>
+            <pc:sldMk cId="4181677636" sldId="264"/>
+            <ac:spMk id="3" creationId="{C176A642-0C87-BA0A-A58A-16E659FCEC0F}"/>
+          </ac:spMkLst>
+        </pc:spChg>
+        <pc:spChg chg="add mod">
+          <ac:chgData name="Camila Utreras" userId="21a7d57e8591b932" providerId="LiveId" clId="{4D9645BA-9693-4AAB-B670-E117DFDC1A3E}" dt="2025-07-29T15:42:42.999" v="86" actId="478"/>
+          <ac:spMkLst>
+            <pc:docMk/>
+            <pc:sldMk cId="4181677636" sldId="264"/>
+            <ac:spMk id="7" creationId="{4BEFA6C3-C866-60BE-04F8-D1BE8A05D975}"/>
+          </ac:spMkLst>
+        </pc:spChg>
+        <pc:picChg chg="add del mod">
+          <ac:chgData name="Camila Utreras" userId="21a7d57e8591b932" providerId="LiveId" clId="{4D9645BA-9693-4AAB-B670-E117DFDC1A3E}" dt="2025-07-29T15:42:42.999" v="86" actId="478"/>
+          <ac:picMkLst>
+            <pc:docMk/>
+            <pc:sldMk cId="4181677636" sldId="264"/>
+            <ac:picMk id="5" creationId="{56B62D25-3F9E-69B5-7562-9FEA78D14D73}"/>
+          </ac:picMkLst>
+        </pc:picChg>
       </pc:sldChg>
     </pc:docChg>
   </pc:docChgLst>
@@ -333,7 +372,7 @@
           <a:p>
             <a:fld id="{DDD52302-C24A-4054-A831-8617910AE7C0}" type="datetimeFigureOut">
               <a:rPr lang="es-CL" smtClean="0"/>
-              <a:t>28-07-2025</a:t>
+              <a:t>29-07-2025</a:t>
             </a:fld>
             <a:endParaRPr lang="es-CL"/>
           </a:p>
@@ -750,7 +789,7 @@
           <a:p>
             <a:fld id="{131FE78F-C25B-4346-B296-79A7CF8DE04A}" type="datetimeFigureOut">
               <a:rPr lang="es-CL" smtClean="0"/>
-              <a:t>28-07-2025</a:t>
+              <a:t>29-07-2025</a:t>
             </a:fld>
             <a:endParaRPr lang="es-CL"/>
           </a:p>
@@ -950,7 +989,7 @@
           <a:p>
             <a:fld id="{131FE78F-C25B-4346-B296-79A7CF8DE04A}" type="datetimeFigureOut">
               <a:rPr lang="es-CL" smtClean="0"/>
-              <a:t>28-07-2025</a:t>
+              <a:t>29-07-2025</a:t>
             </a:fld>
             <a:endParaRPr lang="es-CL"/>
           </a:p>
@@ -1160,7 +1199,7 @@
           <a:p>
             <a:fld id="{131FE78F-C25B-4346-B296-79A7CF8DE04A}" type="datetimeFigureOut">
               <a:rPr lang="es-CL" smtClean="0"/>
-              <a:t>28-07-2025</a:t>
+              <a:t>29-07-2025</a:t>
             </a:fld>
             <a:endParaRPr lang="es-CL"/>
           </a:p>
@@ -1360,7 +1399,7 @@
           <a:p>
             <a:fld id="{131FE78F-C25B-4346-B296-79A7CF8DE04A}" type="datetimeFigureOut">
               <a:rPr lang="es-CL" smtClean="0"/>
-              <a:t>28-07-2025</a:t>
+              <a:t>29-07-2025</a:t>
             </a:fld>
             <a:endParaRPr lang="es-CL"/>
           </a:p>
@@ -1636,7 +1675,7 @@
           <a:p>
             <a:fld id="{131FE78F-C25B-4346-B296-79A7CF8DE04A}" type="datetimeFigureOut">
               <a:rPr lang="es-CL" smtClean="0"/>
-              <a:t>28-07-2025</a:t>
+              <a:t>29-07-2025</a:t>
             </a:fld>
             <a:endParaRPr lang="es-CL"/>
           </a:p>
@@ -1904,7 +1943,7 @@
           <a:p>
             <a:fld id="{131FE78F-C25B-4346-B296-79A7CF8DE04A}" type="datetimeFigureOut">
               <a:rPr lang="es-CL" smtClean="0"/>
-              <a:t>28-07-2025</a:t>
+              <a:t>29-07-2025</a:t>
             </a:fld>
             <a:endParaRPr lang="es-CL"/>
           </a:p>
@@ -2319,7 +2358,7 @@
           <a:p>
             <a:fld id="{131FE78F-C25B-4346-B296-79A7CF8DE04A}" type="datetimeFigureOut">
               <a:rPr lang="es-CL" smtClean="0"/>
-              <a:t>28-07-2025</a:t>
+              <a:t>29-07-2025</a:t>
             </a:fld>
             <a:endParaRPr lang="es-CL"/>
           </a:p>
@@ -2461,7 +2500,7 @@
           <a:p>
             <a:fld id="{131FE78F-C25B-4346-B296-79A7CF8DE04A}" type="datetimeFigureOut">
               <a:rPr lang="es-CL" smtClean="0"/>
-              <a:t>28-07-2025</a:t>
+              <a:t>29-07-2025</a:t>
             </a:fld>
             <a:endParaRPr lang="es-CL"/>
           </a:p>
@@ -2574,7 +2613,7 @@
           <a:p>
             <a:fld id="{131FE78F-C25B-4346-B296-79A7CF8DE04A}" type="datetimeFigureOut">
               <a:rPr lang="es-CL" smtClean="0"/>
-              <a:t>28-07-2025</a:t>
+              <a:t>29-07-2025</a:t>
             </a:fld>
             <a:endParaRPr lang="es-CL"/>
           </a:p>
@@ -2887,7 +2926,7 @@
           <a:p>
             <a:fld id="{131FE78F-C25B-4346-B296-79A7CF8DE04A}" type="datetimeFigureOut">
               <a:rPr lang="es-CL" smtClean="0"/>
-              <a:t>28-07-2025</a:t>
+              <a:t>29-07-2025</a:t>
             </a:fld>
             <a:endParaRPr lang="es-CL"/>
           </a:p>
@@ -3176,7 +3215,7 @@
           <a:p>
             <a:fld id="{131FE78F-C25B-4346-B296-79A7CF8DE04A}" type="datetimeFigureOut">
               <a:rPr lang="es-CL" smtClean="0"/>
-              <a:t>28-07-2025</a:t>
+              <a:t>29-07-2025</a:t>
             </a:fld>
             <a:endParaRPr lang="es-CL"/>
           </a:p>
@@ -3419,7 +3458,7 @@
           <a:p>
             <a:fld id="{131FE78F-C25B-4346-B296-79A7CF8DE04A}" type="datetimeFigureOut">
               <a:rPr lang="es-CL" smtClean="0"/>
-              <a:t>28-07-2025</a:t>
+              <a:t>29-07-2025</a:t>
             </a:fld>
             <a:endParaRPr lang="es-CL"/>
           </a:p>
@@ -7105,7 +7144,7 @@
           <p:nvPr>
             <p:extLst>
               <p:ext uri="{D42A27DB-BD31-4B8C-83A1-F6EECF244321}">
-                <p14:modId xmlns:p14="http://schemas.microsoft.com/office/powerpoint/2010/main" val="2752074392"/>
+                <p14:modId xmlns:p14="http://schemas.microsoft.com/office/powerpoint/2010/main" val="702115467"/>
               </p:ext>
             </p:extLst>
           </p:nvPr>
@@ -7118,7 +7157,7 @@
           <a:graphicData uri="http://schemas.openxmlformats.org/drawingml/2006/table">
             <a:tbl>
               <a:tblPr firstRow="1" firstCol="1">
-                <a:tableStyleId>{5C22544A-7EE6-4342-B048-85BDC9FD1C3A}</a:tableStyleId>
+                <a:tableStyleId>{00A15C55-8517-42AA-B614-E9B94910E393}</a:tableStyleId>
               </a:tblPr>
               <a:tblGrid>
                 <a:gridCol w="1752600">

</xml_diff>